<commit_message>
Update the PowerPoint/Word Doc.
</commit_message>
<xml_diff>
--- a/doc/Bigdataproposal.pptx
+++ b/doc/Bigdataproposal.pptx
@@ -6295,8 +6295,8 @@
         <a:lstStyle/>
         <a:p>
           <a:r>
-            <a:rPr lang="en-US"/>
-            <a:t>Past few years youTube has become quiet popular</a:t>
+            <a:rPr lang="en-US" dirty="0"/>
+            <a:t>YouTube is the number one video sharing site on the internet.</a:t>
           </a:r>
         </a:p>
       </dgm:t>
@@ -6331,8 +6331,8 @@
         <a:lstStyle/>
         <a:p>
           <a:r>
-            <a:rPr lang="en-US"/>
-            <a:t>Millions of visits per day</a:t>
+            <a:rPr lang="en-US" dirty="0"/>
+            <a:t>Over 1 Billion unique visitors each month.</a:t>
           </a:r>
         </a:p>
       </dgm:t>
@@ -6367,8 +6367,8 @@
         <a:lstStyle/>
         <a:p>
           <a:r>
-            <a:rPr lang="en-US"/>
-            <a:t>Huge web crawl dataset</a:t>
+            <a:rPr lang="en-US" dirty="0"/>
+            <a:t>Big audience means big data</a:t>
           </a:r>
         </a:p>
       </dgm:t>
@@ -6403,8 +6403,8 @@
         <a:lstStyle/>
         <a:p>
           <a:r>
-            <a:rPr lang="en-US"/>
-            <a:t>Lot of analytics can be done which makes it easier to find and discover great video content</a:t>
+            <a:rPr lang="en-US" dirty="0"/>
+            <a:t>Huge opportunity to improve the recommendation engine to increase viewing time.</a:t>
           </a:r>
         </a:p>
       </dgm:t>
@@ -6439,8 +6439,8 @@
         <a:lstStyle/>
         <a:p>
           <a:r>
-            <a:rPr lang="en-US"/>
-            <a:t>Accelerate research on large scale video understanding</a:t>
+            <a:rPr lang="en-US" dirty="0"/>
+            <a:t>The PageRank algorithm can be applied to YouTube videos to determine the highest quality videos.</a:t>
           </a:r>
         </a:p>
       </dgm:t>
@@ -6800,7 +6800,7 @@
         <a:p>
           <a:r>
             <a:rPr lang="en-US" sz="2000" dirty="0"/>
-            <a:t>Search YouTube Data</a:t>
+            <a:t>Search Analytics</a:t>
           </a:r>
         </a:p>
       </dgm:t>
@@ -6839,7 +6839,7 @@
         <a:p>
           <a:r>
             <a:rPr lang="en-US" sz="2000" dirty="0"/>
-            <a:t>Airline data Analysis</a:t>
+            <a:t>Air Traffic Analytics</a:t>
           </a:r>
         </a:p>
       </dgm:t>
@@ -6860,7 +6860,7 @@
         <a:p>
           <a:r>
             <a:rPr lang="en-US" sz="2000" dirty="0"/>
-            <a:t>Weather data Analysis</a:t>
+            <a:t>Weather Analytics</a:t>
           </a:r>
         </a:p>
       </dgm:t>
@@ -6892,7 +6892,7 @@
         <a:p>
           <a:r>
             <a:rPr lang="en-US" sz="2000" dirty="0"/>
-            <a:t>Sentiment Analysis on Twitter</a:t>
+            <a:t>Twitter Sentiment Analysis</a:t>
           </a:r>
         </a:p>
       </dgm:t>
@@ -6913,7 +6913,7 @@
         <a:p>
           <a:r>
             <a:rPr lang="en-US" sz="2000" dirty="0"/>
-            <a:t>Analyzing Stock Market data</a:t>
+            <a:t>Stock Market Analytics</a:t>
           </a:r>
         </a:p>
       </dgm:t>
@@ -6945,7 +6945,7 @@
         <a:p>
           <a:r>
             <a:rPr lang="en-US" sz="2000" dirty="0"/>
-            <a:t>Movies dataset Analysis on IMDB</a:t>
+            <a:t>IMDb Data Analytics </a:t>
           </a:r>
         </a:p>
       </dgm:t>
@@ -9316,7 +9316,7 @@
         </a:bodyPr>
         <a:lstStyle/>
         <a:p>
-          <a:pPr marL="0" lvl="0" indent="0" algn="l" defTabSz="844550">
+          <a:pPr marL="0" lvl="0" indent="0" algn="l" defTabSz="755650">
             <a:lnSpc>
               <a:spcPct val="90000"/>
             </a:lnSpc>
@@ -9329,8 +9329,8 @@
             <a:buNone/>
           </a:pPr>
           <a:r>
-            <a:rPr lang="en-US" sz="1900" kern="1200"/>
-            <a:t>Past few years youTube has become quiet popular</a:t>
+            <a:rPr lang="en-US" sz="1700" kern="1200" dirty="0"/>
+            <a:t>YouTube is the number one video sharing site on the internet.</a:t>
           </a:r>
         </a:p>
       </dsp:txBody>
@@ -9474,7 +9474,7 @@
         </a:bodyPr>
         <a:lstStyle/>
         <a:p>
-          <a:pPr marL="0" lvl="0" indent="0" algn="l" defTabSz="844550">
+          <a:pPr marL="0" lvl="0" indent="0" algn="l" defTabSz="755650">
             <a:lnSpc>
               <a:spcPct val="90000"/>
             </a:lnSpc>
@@ -9487,8 +9487,8 @@
             <a:buNone/>
           </a:pPr>
           <a:r>
-            <a:rPr lang="en-US" sz="1900" kern="1200"/>
-            <a:t>Millions of visits per day</a:t>
+            <a:rPr lang="en-US" sz="1700" kern="1200" dirty="0"/>
+            <a:t>Over 1 Billion unique visitors each month.</a:t>
           </a:r>
         </a:p>
       </dsp:txBody>
@@ -9632,7 +9632,7 @@
         </a:bodyPr>
         <a:lstStyle/>
         <a:p>
-          <a:pPr marL="0" lvl="0" indent="0" algn="l" defTabSz="844550">
+          <a:pPr marL="0" lvl="0" indent="0" algn="l" defTabSz="755650">
             <a:lnSpc>
               <a:spcPct val="90000"/>
             </a:lnSpc>
@@ -9645,8 +9645,8 @@
             <a:buNone/>
           </a:pPr>
           <a:r>
-            <a:rPr lang="en-US" sz="1900" kern="1200"/>
-            <a:t>Huge web crawl dataset</a:t>
+            <a:rPr lang="en-US" sz="1700" kern="1200" dirty="0"/>
+            <a:t>Big audience means big data</a:t>
           </a:r>
         </a:p>
       </dsp:txBody>
@@ -9790,7 +9790,7 @@
         </a:bodyPr>
         <a:lstStyle/>
         <a:p>
-          <a:pPr marL="0" lvl="0" indent="0" algn="l" defTabSz="844550">
+          <a:pPr marL="0" lvl="0" indent="0" algn="l" defTabSz="755650">
             <a:lnSpc>
               <a:spcPct val="90000"/>
             </a:lnSpc>
@@ -9803,8 +9803,8 @@
             <a:buNone/>
           </a:pPr>
           <a:r>
-            <a:rPr lang="en-US" sz="1900" kern="1200"/>
-            <a:t>Lot of analytics can be done which makes it easier to find and discover great video content</a:t>
+            <a:rPr lang="en-US" sz="1700" kern="1200" dirty="0"/>
+            <a:t>Huge opportunity to improve the recommendation engine to increase viewing time.</a:t>
           </a:r>
         </a:p>
       </dsp:txBody>
@@ -9948,7 +9948,7 @@
         </a:bodyPr>
         <a:lstStyle/>
         <a:p>
-          <a:pPr marL="0" lvl="0" indent="0" algn="l" defTabSz="844550">
+          <a:pPr marL="0" lvl="0" indent="0" algn="l" defTabSz="755650">
             <a:lnSpc>
               <a:spcPct val="90000"/>
             </a:lnSpc>
@@ -9961,8 +9961,8 @@
             <a:buNone/>
           </a:pPr>
           <a:r>
-            <a:rPr lang="en-US" sz="1900" kern="1200"/>
-            <a:t>Accelerate research on large scale video understanding</a:t>
+            <a:rPr lang="en-US" sz="1700" kern="1200" dirty="0"/>
+            <a:t>The PageRank algorithm can be applied to YouTube videos to determine the highest quality videos.</a:t>
           </a:r>
         </a:p>
       </dsp:txBody>
@@ -10052,7 +10052,7 @@
           </a:pPr>
           <a:r>
             <a:rPr lang="en-US" sz="2000" kern="1200" dirty="0"/>
-            <a:t>Search YouTube Data</a:t>
+            <a:t>Search Analytics</a:t>
           </a:r>
         </a:p>
       </dsp:txBody>
@@ -10168,7 +10168,7 @@
           </a:pPr>
           <a:r>
             <a:rPr lang="en-US" sz="2000" kern="1200" dirty="0"/>
-            <a:t>Airline data Analysis</a:t>
+            <a:t>Air Traffic Analytics</a:t>
           </a:r>
         </a:p>
       </dsp:txBody>
@@ -10246,7 +10246,7 @@
           </a:pPr>
           <a:r>
             <a:rPr lang="en-US" sz="2000" kern="1200" dirty="0"/>
-            <a:t>Weather data Analysis</a:t>
+            <a:t>Weather Analytics</a:t>
           </a:r>
         </a:p>
       </dsp:txBody>
@@ -10356,7 +10356,7 @@
           </a:pPr>
           <a:r>
             <a:rPr lang="en-US" sz="2000" kern="1200" dirty="0"/>
-            <a:t>Sentiment Analysis on Twitter</a:t>
+            <a:t>Twitter Sentiment Analysis</a:t>
           </a:r>
         </a:p>
       </dsp:txBody>
@@ -10434,7 +10434,7 @@
           </a:pPr>
           <a:r>
             <a:rPr lang="en-US" sz="2000" kern="1200" dirty="0"/>
-            <a:t>Analyzing Stock Market data</a:t>
+            <a:t>Stock Market Analytics</a:t>
           </a:r>
         </a:p>
       </dsp:txBody>
@@ -10544,7 +10544,7 @@
           </a:pPr>
           <a:r>
             <a:rPr lang="en-US" sz="2000" kern="1200" dirty="0"/>
-            <a:t>Movies dataset Analysis on IMDB</a:t>
+            <a:t>IMDb Data Analytics </a:t>
           </a:r>
         </a:p>
       </dsp:txBody>
@@ -36018,7 +36018,7 @@
             <p:ph idx="1"/>
             <p:extLst>
               <p:ext uri="{D42A27DB-BD31-4B8C-83A1-F6EECF244321}">
-                <p14:modId xmlns:p14="http://schemas.microsoft.com/office/powerpoint/2010/main" val="1547009996"/>
+                <p14:modId xmlns:p14="http://schemas.microsoft.com/office/powerpoint/2010/main" val="3287305773"/>
               </p:ext>
             </p:extLst>
           </p:nvPr>
@@ -36111,7 +36111,7 @@
           <p:nvPr>
             <p:extLst>
               <p:ext uri="{D42A27DB-BD31-4B8C-83A1-F6EECF244321}">
-                <p14:modId xmlns:p14="http://schemas.microsoft.com/office/powerpoint/2010/main" val="1092976216"/>
+                <p14:modId xmlns:p14="http://schemas.microsoft.com/office/powerpoint/2010/main" val="3695335564"/>
               </p:ext>
             </p:extLst>
           </p:nvPr>

</xml_diff>